<commit_message>
Nouveau design du site
</commit_message>
<xml_diff>
--- a/doc/maquettes.pptx
+++ b/doc/maquettes.pptx
@@ -293,7 +293,7 @@
           <a:p>
             <a:fld id="{82A05850-F439-4121-A019-4929A5B41816}" type="datetimeFigureOut">
               <a:rPr lang="fr-FR" smtClean="0"/>
-              <a:t>25/03/2019</a:t>
+              <a:t>29/03/2019</a:t>
             </a:fld>
             <a:endParaRPr lang="fr-FR"/>
           </a:p>
@@ -463,7 +463,7 @@
           <a:p>
             <a:fld id="{82A05850-F439-4121-A019-4929A5B41816}" type="datetimeFigureOut">
               <a:rPr lang="fr-FR" smtClean="0"/>
-              <a:t>25/03/2019</a:t>
+              <a:t>29/03/2019</a:t>
             </a:fld>
             <a:endParaRPr lang="fr-FR"/>
           </a:p>
@@ -643,7 +643,7 @@
           <a:p>
             <a:fld id="{82A05850-F439-4121-A019-4929A5B41816}" type="datetimeFigureOut">
               <a:rPr lang="fr-FR" smtClean="0"/>
-              <a:t>25/03/2019</a:t>
+              <a:t>29/03/2019</a:t>
             </a:fld>
             <a:endParaRPr lang="fr-FR"/>
           </a:p>
@@ -813,7 +813,7 @@
           <a:p>
             <a:fld id="{82A05850-F439-4121-A019-4929A5B41816}" type="datetimeFigureOut">
               <a:rPr lang="fr-FR" smtClean="0"/>
-              <a:t>25/03/2019</a:t>
+              <a:t>29/03/2019</a:t>
             </a:fld>
             <a:endParaRPr lang="fr-FR"/>
           </a:p>
@@ -1059,7 +1059,7 @@
           <a:p>
             <a:fld id="{82A05850-F439-4121-A019-4929A5B41816}" type="datetimeFigureOut">
               <a:rPr lang="fr-FR" smtClean="0"/>
-              <a:t>25/03/2019</a:t>
+              <a:t>29/03/2019</a:t>
             </a:fld>
             <a:endParaRPr lang="fr-FR"/>
           </a:p>
@@ -1347,7 +1347,7 @@
           <a:p>
             <a:fld id="{82A05850-F439-4121-A019-4929A5B41816}" type="datetimeFigureOut">
               <a:rPr lang="fr-FR" smtClean="0"/>
-              <a:t>25/03/2019</a:t>
+              <a:t>29/03/2019</a:t>
             </a:fld>
             <a:endParaRPr lang="fr-FR"/>
           </a:p>
@@ -1769,7 +1769,7 @@
           <a:p>
             <a:fld id="{82A05850-F439-4121-A019-4929A5B41816}" type="datetimeFigureOut">
               <a:rPr lang="fr-FR" smtClean="0"/>
-              <a:t>25/03/2019</a:t>
+              <a:t>29/03/2019</a:t>
             </a:fld>
             <a:endParaRPr lang="fr-FR"/>
           </a:p>
@@ -1887,7 +1887,7 @@
           <a:p>
             <a:fld id="{82A05850-F439-4121-A019-4929A5B41816}" type="datetimeFigureOut">
               <a:rPr lang="fr-FR" smtClean="0"/>
-              <a:t>25/03/2019</a:t>
+              <a:t>29/03/2019</a:t>
             </a:fld>
             <a:endParaRPr lang="fr-FR"/>
           </a:p>
@@ -1982,7 +1982,7 @@
           <a:p>
             <a:fld id="{82A05850-F439-4121-A019-4929A5B41816}" type="datetimeFigureOut">
               <a:rPr lang="fr-FR" smtClean="0"/>
-              <a:t>25/03/2019</a:t>
+              <a:t>29/03/2019</a:t>
             </a:fld>
             <a:endParaRPr lang="fr-FR"/>
           </a:p>
@@ -2259,7 +2259,7 @@
           <a:p>
             <a:fld id="{82A05850-F439-4121-A019-4929A5B41816}" type="datetimeFigureOut">
               <a:rPr lang="fr-FR" smtClean="0"/>
-              <a:t>25/03/2019</a:t>
+              <a:t>29/03/2019</a:t>
             </a:fld>
             <a:endParaRPr lang="fr-FR"/>
           </a:p>
@@ -2512,7 +2512,7 @@
           <a:p>
             <a:fld id="{82A05850-F439-4121-A019-4929A5B41816}" type="datetimeFigureOut">
               <a:rPr lang="fr-FR" smtClean="0"/>
-              <a:t>25/03/2019</a:t>
+              <a:t>29/03/2019</a:t>
             </a:fld>
             <a:endParaRPr lang="fr-FR"/>
           </a:p>
@@ -2725,7 +2725,7 @@
           <a:p>
             <a:fld id="{82A05850-F439-4121-A019-4929A5B41816}" type="datetimeFigureOut">
               <a:rPr lang="fr-FR" smtClean="0"/>
-              <a:t>25/03/2019</a:t>
+              <a:t>29/03/2019</a:t>
             </a:fld>
             <a:endParaRPr lang="fr-FR"/>
           </a:p>
@@ -3276,7 +3276,7 @@
         <p:spPr>
           <a:xfrm>
             <a:off x="107504" y="364014"/>
-            <a:ext cx="6624736" cy="307777"/>
+            <a:ext cx="6624736" cy="523220"/>
           </a:xfrm>
           <a:prstGeom prst="rect">
             <a:avLst/>
@@ -3295,7 +3295,23 @@
                   <a:srgbClr val="0070C0"/>
                 </a:solidFill>
               </a:rPr>
-              <a:t>Accueil | La cantine | La fontaine à eau | Les fournitures scolaires | Nous contacter</a:t>
+              <a:t>Accueil | </a:t>
+            </a:r>
+            <a:r>
+              <a:rPr lang="fr-FR" sz="1400" dirty="0" smtClean="0">
+                <a:solidFill>
+                  <a:srgbClr val="0070C0"/>
+                </a:solidFill>
+              </a:rPr>
+              <a:t>Qui sommes nous ? |La </a:t>
+            </a:r>
+            <a:r>
+              <a:rPr lang="fr-FR" sz="1400" dirty="0" smtClean="0">
+                <a:solidFill>
+                  <a:srgbClr val="0070C0"/>
+                </a:solidFill>
+              </a:rPr>
+              <a:t>cantine | La fontaine à eau | Les fournitures scolaires | Nous contacter</a:t>
             </a:r>
             <a:endParaRPr lang="fr-FR" sz="1400" dirty="0">
               <a:solidFill>
@@ -3746,44 +3762,6 @@
       </p:sp>
       <p:sp>
         <p:nvSpPr>
-          <p:cNvPr id="8" name="ZoneTexte 7"/>
-          <p:cNvSpPr txBox="1"/>
-          <p:nvPr/>
-        </p:nvSpPr>
-        <p:spPr>
-          <a:xfrm>
-            <a:off x="107504" y="364014"/>
-            <a:ext cx="6624736" cy="307777"/>
-          </a:xfrm>
-          <a:prstGeom prst="rect">
-            <a:avLst/>
-          </a:prstGeom>
-          <a:noFill/>
-        </p:spPr>
-        <p:txBody>
-          <a:bodyPr wrap="square" rtlCol="0">
-            <a:spAutoFit/>
-          </a:bodyPr>
-          <a:lstStyle/>
-          <a:p>
-            <a:r>
-              <a:rPr lang="fr-FR" sz="1400" dirty="0" smtClean="0">
-                <a:solidFill>
-                  <a:srgbClr val="0070C0"/>
-                </a:solidFill>
-              </a:rPr>
-              <a:t>Accueil | La cantine | La fontaine à eau | Les fournitures scolaires | Nous contacter</a:t>
-            </a:r>
-            <a:endParaRPr lang="fr-FR" sz="1400" dirty="0">
-              <a:solidFill>
-                <a:srgbClr val="0070C0"/>
-              </a:solidFill>
-            </a:endParaRPr>
-          </a:p>
-        </p:txBody>
-      </p:sp>
-      <p:sp>
-        <p:nvSpPr>
           <p:cNvPr id="9" name="Rectangle 8"/>
           <p:cNvSpPr/>
           <p:nvPr/>
@@ -4078,6 +4056,60 @@
               <a:t>Image de fond</a:t>
             </a:r>
             <a:endParaRPr lang="fr-FR" dirty="0">
+              <a:solidFill>
+                <a:srgbClr val="0070C0"/>
+              </a:solidFill>
+            </a:endParaRPr>
+          </a:p>
+        </p:txBody>
+      </p:sp>
+      <p:sp>
+        <p:nvSpPr>
+          <p:cNvPr id="13" name="ZoneTexte 12"/>
+          <p:cNvSpPr txBox="1"/>
+          <p:nvPr/>
+        </p:nvSpPr>
+        <p:spPr>
+          <a:xfrm>
+            <a:off x="107504" y="364014"/>
+            <a:ext cx="6624736" cy="523220"/>
+          </a:xfrm>
+          <a:prstGeom prst="rect">
+            <a:avLst/>
+          </a:prstGeom>
+          <a:noFill/>
+        </p:spPr>
+        <p:txBody>
+          <a:bodyPr wrap="square" rtlCol="0">
+            <a:spAutoFit/>
+          </a:bodyPr>
+          <a:lstStyle/>
+          <a:p>
+            <a:r>
+              <a:rPr lang="fr-FR" sz="1400" dirty="0" smtClean="0">
+                <a:solidFill>
+                  <a:srgbClr val="0070C0"/>
+                </a:solidFill>
+              </a:rPr>
+              <a:t>Accueil | </a:t>
+            </a:r>
+            <a:r>
+              <a:rPr lang="fr-FR" sz="1400" dirty="0" smtClean="0">
+                <a:solidFill>
+                  <a:srgbClr val="0070C0"/>
+                </a:solidFill>
+              </a:rPr>
+              <a:t>Qui sommes nous ? |La </a:t>
+            </a:r>
+            <a:r>
+              <a:rPr lang="fr-FR" sz="1400" dirty="0" smtClean="0">
+                <a:solidFill>
+                  <a:srgbClr val="0070C0"/>
+                </a:solidFill>
+              </a:rPr>
+              <a:t>cantine | La fontaine à eau | Les fournitures scolaires | Nous contacter</a:t>
+            </a:r>
+            <a:endParaRPr lang="fr-FR" sz="1400" dirty="0">
               <a:solidFill>
                 <a:srgbClr val="0070C0"/>
               </a:solidFill>
@@ -4244,44 +4276,6 @@
       </p:sp>
       <p:sp>
         <p:nvSpPr>
-          <p:cNvPr id="8" name="ZoneTexte 7"/>
-          <p:cNvSpPr txBox="1"/>
-          <p:nvPr/>
-        </p:nvSpPr>
-        <p:spPr>
-          <a:xfrm>
-            <a:off x="107504" y="364014"/>
-            <a:ext cx="6624736" cy="307777"/>
-          </a:xfrm>
-          <a:prstGeom prst="rect">
-            <a:avLst/>
-          </a:prstGeom>
-          <a:noFill/>
-        </p:spPr>
-        <p:txBody>
-          <a:bodyPr wrap="square" rtlCol="0">
-            <a:spAutoFit/>
-          </a:bodyPr>
-          <a:lstStyle/>
-          <a:p>
-            <a:r>
-              <a:rPr lang="fr-FR" sz="1400" dirty="0" smtClean="0">
-                <a:solidFill>
-                  <a:srgbClr val="0070C0"/>
-                </a:solidFill>
-              </a:rPr>
-              <a:t>Accueil | La cantine | La fontaine à eau | Les fournitures scolaires | Nous contacter</a:t>
-            </a:r>
-            <a:endParaRPr lang="fr-FR" sz="1400" dirty="0">
-              <a:solidFill>
-                <a:srgbClr val="0070C0"/>
-              </a:solidFill>
-            </a:endParaRPr>
-          </a:p>
-        </p:txBody>
-      </p:sp>
-      <p:sp>
-        <p:nvSpPr>
           <p:cNvPr id="9" name="Rectangle 8"/>
           <p:cNvSpPr/>
           <p:nvPr/>
@@ -4576,6 +4570,60 @@
               <a:t>Image de fond</a:t>
             </a:r>
             <a:endParaRPr lang="fr-FR" dirty="0">
+              <a:solidFill>
+                <a:srgbClr val="0070C0"/>
+              </a:solidFill>
+            </a:endParaRPr>
+          </a:p>
+        </p:txBody>
+      </p:sp>
+      <p:sp>
+        <p:nvSpPr>
+          <p:cNvPr id="12" name="ZoneTexte 11"/>
+          <p:cNvSpPr txBox="1"/>
+          <p:nvPr/>
+        </p:nvSpPr>
+        <p:spPr>
+          <a:xfrm>
+            <a:off x="107504" y="364014"/>
+            <a:ext cx="6624736" cy="523220"/>
+          </a:xfrm>
+          <a:prstGeom prst="rect">
+            <a:avLst/>
+          </a:prstGeom>
+          <a:noFill/>
+        </p:spPr>
+        <p:txBody>
+          <a:bodyPr wrap="square" rtlCol="0">
+            <a:spAutoFit/>
+          </a:bodyPr>
+          <a:lstStyle/>
+          <a:p>
+            <a:r>
+              <a:rPr lang="fr-FR" sz="1400" dirty="0" smtClean="0">
+                <a:solidFill>
+                  <a:srgbClr val="0070C0"/>
+                </a:solidFill>
+              </a:rPr>
+              <a:t>Accueil | </a:t>
+            </a:r>
+            <a:r>
+              <a:rPr lang="fr-FR" sz="1400" dirty="0" smtClean="0">
+                <a:solidFill>
+                  <a:srgbClr val="0070C0"/>
+                </a:solidFill>
+              </a:rPr>
+              <a:t>Qui sommes nous ? |La </a:t>
+            </a:r>
+            <a:r>
+              <a:rPr lang="fr-FR" sz="1400" dirty="0" smtClean="0">
+                <a:solidFill>
+                  <a:srgbClr val="0070C0"/>
+                </a:solidFill>
+              </a:rPr>
+              <a:t>cantine | La fontaine à eau | Les fournitures scolaires | Nous contacter</a:t>
+            </a:r>
+            <a:endParaRPr lang="fr-FR" sz="1400" dirty="0">
               <a:solidFill>
                 <a:srgbClr val="0070C0"/>
               </a:solidFill>
@@ -4742,44 +4790,6 @@
       </p:sp>
       <p:sp>
         <p:nvSpPr>
-          <p:cNvPr id="8" name="ZoneTexte 7"/>
-          <p:cNvSpPr txBox="1"/>
-          <p:nvPr/>
-        </p:nvSpPr>
-        <p:spPr>
-          <a:xfrm>
-            <a:off x="107504" y="364014"/>
-            <a:ext cx="6624736" cy="307777"/>
-          </a:xfrm>
-          <a:prstGeom prst="rect">
-            <a:avLst/>
-          </a:prstGeom>
-          <a:noFill/>
-        </p:spPr>
-        <p:txBody>
-          <a:bodyPr wrap="square" rtlCol="0">
-            <a:spAutoFit/>
-          </a:bodyPr>
-          <a:lstStyle/>
-          <a:p>
-            <a:r>
-              <a:rPr lang="fr-FR" sz="1400" dirty="0" smtClean="0">
-                <a:solidFill>
-                  <a:srgbClr val="0070C0"/>
-                </a:solidFill>
-              </a:rPr>
-              <a:t>Accueil | La cantine | La fontaine à eau | Les fournitures scolaires | Nous contacter</a:t>
-            </a:r>
-            <a:endParaRPr lang="fr-FR" sz="1400" dirty="0">
-              <a:solidFill>
-                <a:srgbClr val="0070C0"/>
-              </a:solidFill>
-            </a:endParaRPr>
-          </a:p>
-        </p:txBody>
-      </p:sp>
-      <p:sp>
-        <p:nvSpPr>
           <p:cNvPr id="9" name="Rectangle 8"/>
           <p:cNvSpPr/>
           <p:nvPr/>
@@ -5074,6 +5084,60 @@
               <a:t>Image de fond</a:t>
             </a:r>
             <a:endParaRPr lang="fr-FR" dirty="0">
+              <a:solidFill>
+                <a:srgbClr val="0070C0"/>
+              </a:solidFill>
+            </a:endParaRPr>
+          </a:p>
+        </p:txBody>
+      </p:sp>
+      <p:sp>
+        <p:nvSpPr>
+          <p:cNvPr id="16" name="ZoneTexte 15"/>
+          <p:cNvSpPr txBox="1"/>
+          <p:nvPr/>
+        </p:nvSpPr>
+        <p:spPr>
+          <a:xfrm>
+            <a:off x="107504" y="364014"/>
+            <a:ext cx="6624736" cy="523220"/>
+          </a:xfrm>
+          <a:prstGeom prst="rect">
+            <a:avLst/>
+          </a:prstGeom>
+          <a:noFill/>
+        </p:spPr>
+        <p:txBody>
+          <a:bodyPr wrap="square" rtlCol="0">
+            <a:spAutoFit/>
+          </a:bodyPr>
+          <a:lstStyle/>
+          <a:p>
+            <a:r>
+              <a:rPr lang="fr-FR" sz="1400" dirty="0" smtClean="0">
+                <a:solidFill>
+                  <a:srgbClr val="0070C0"/>
+                </a:solidFill>
+              </a:rPr>
+              <a:t>Accueil | </a:t>
+            </a:r>
+            <a:r>
+              <a:rPr lang="fr-FR" sz="1400" dirty="0" smtClean="0">
+                <a:solidFill>
+                  <a:srgbClr val="0070C0"/>
+                </a:solidFill>
+              </a:rPr>
+              <a:t>Qui sommes nous ? |La </a:t>
+            </a:r>
+            <a:r>
+              <a:rPr lang="fr-FR" sz="1400" dirty="0" smtClean="0">
+                <a:solidFill>
+                  <a:srgbClr val="0070C0"/>
+                </a:solidFill>
+              </a:rPr>
+              <a:t>cantine | La fontaine à eau | Les fournitures scolaires | Nous contacter</a:t>
+            </a:r>
+            <a:endParaRPr lang="fr-FR" sz="1400" dirty="0">
               <a:solidFill>
                 <a:srgbClr val="0070C0"/>
               </a:solidFill>

</xml_diff>